<commit_message>
fixup root index and remove example PCC
</commit_message>
<xml_diff>
--- a/ITI/IUA/media/Actors.pptx
+++ b/ITI/IUA/media/Actors.pptx
@@ -104,6 +104,11 @@
       </a:defRPr>
     </a:lvl9pPr>
   </p:defaultTextStyle>
+  <p:extLst>
+    <p:ext uri="{EFAFB233-063F-42B5-8137-9DF3F51BA10A}">
+      <p15:sldGuideLst xmlns:p15="http://schemas.microsoft.com/office/powerpoint/2012/main"/>
+    </p:ext>
+  </p:extLst>
 </p:presentation>
 </file>
 
@@ -254,7 +259,7 @@
           <a:p>
             <a:fld id="{2918C6F3-AC54-45A0-A520-9E4A82C59666}" type="datetimeFigureOut">
               <a:rPr lang="en-US" smtClean="0"/>
-              <a:t>10/19/2020</a:t>
+              <a:t>11/12/2020</a:t>
             </a:fld>
             <a:endParaRPr lang="en-US"/>
           </a:p>
@@ -452,7 +457,7 @@
           <a:p>
             <a:fld id="{2918C6F3-AC54-45A0-A520-9E4A82C59666}" type="datetimeFigureOut">
               <a:rPr lang="en-US" smtClean="0"/>
-              <a:t>10/19/2020</a:t>
+              <a:t>11/12/2020</a:t>
             </a:fld>
             <a:endParaRPr lang="en-US"/>
           </a:p>
@@ -660,7 +665,7 @@
           <a:p>
             <a:fld id="{2918C6F3-AC54-45A0-A520-9E4A82C59666}" type="datetimeFigureOut">
               <a:rPr lang="en-US" smtClean="0"/>
-              <a:t>10/19/2020</a:t>
+              <a:t>11/12/2020</a:t>
             </a:fld>
             <a:endParaRPr lang="en-US"/>
           </a:p>
@@ -858,7 +863,7 @@
           <a:p>
             <a:fld id="{2918C6F3-AC54-45A0-A520-9E4A82C59666}" type="datetimeFigureOut">
               <a:rPr lang="en-US" smtClean="0"/>
-              <a:t>10/19/2020</a:t>
+              <a:t>11/12/2020</a:t>
             </a:fld>
             <a:endParaRPr lang="en-US"/>
           </a:p>
@@ -1133,7 +1138,7 @@
           <a:p>
             <a:fld id="{2918C6F3-AC54-45A0-A520-9E4A82C59666}" type="datetimeFigureOut">
               <a:rPr lang="en-US" smtClean="0"/>
-              <a:t>10/19/2020</a:t>
+              <a:t>11/12/2020</a:t>
             </a:fld>
             <a:endParaRPr lang="en-US"/>
           </a:p>
@@ -1398,7 +1403,7 @@
           <a:p>
             <a:fld id="{2918C6F3-AC54-45A0-A520-9E4A82C59666}" type="datetimeFigureOut">
               <a:rPr lang="en-US" smtClean="0"/>
-              <a:t>10/19/2020</a:t>
+              <a:t>11/12/2020</a:t>
             </a:fld>
             <a:endParaRPr lang="en-US"/>
           </a:p>
@@ -1810,7 +1815,7 @@
           <a:p>
             <a:fld id="{2918C6F3-AC54-45A0-A520-9E4A82C59666}" type="datetimeFigureOut">
               <a:rPr lang="en-US" smtClean="0"/>
-              <a:t>10/19/2020</a:t>
+              <a:t>11/12/2020</a:t>
             </a:fld>
             <a:endParaRPr lang="en-US"/>
           </a:p>
@@ -1951,7 +1956,7 @@
           <a:p>
             <a:fld id="{2918C6F3-AC54-45A0-A520-9E4A82C59666}" type="datetimeFigureOut">
               <a:rPr lang="en-US" smtClean="0"/>
-              <a:t>10/19/2020</a:t>
+              <a:t>11/12/2020</a:t>
             </a:fld>
             <a:endParaRPr lang="en-US"/>
           </a:p>
@@ -2064,7 +2069,7 @@
           <a:p>
             <a:fld id="{2918C6F3-AC54-45A0-A520-9E4A82C59666}" type="datetimeFigureOut">
               <a:rPr lang="en-US" smtClean="0"/>
-              <a:t>10/19/2020</a:t>
+              <a:t>11/12/2020</a:t>
             </a:fld>
             <a:endParaRPr lang="en-US"/>
           </a:p>
@@ -2375,7 +2380,7 @@
           <a:p>
             <a:fld id="{2918C6F3-AC54-45A0-A520-9E4A82C59666}" type="datetimeFigureOut">
               <a:rPr lang="en-US" smtClean="0"/>
-              <a:t>10/19/2020</a:t>
+              <a:t>11/12/2020</a:t>
             </a:fld>
             <a:endParaRPr lang="en-US"/>
           </a:p>
@@ -2663,7 +2668,7 @@
           <a:p>
             <a:fld id="{2918C6F3-AC54-45A0-A520-9E4A82C59666}" type="datetimeFigureOut">
               <a:rPr lang="en-US" smtClean="0"/>
-              <a:t>10/19/2020</a:t>
+              <a:t>11/12/2020</a:t>
             </a:fld>
             <a:endParaRPr lang="en-US"/>
           </a:p>
@@ -2904,7 +2909,7 @@
           <a:p>
             <a:fld id="{2918C6F3-AC54-45A0-A520-9E4A82C59666}" type="datetimeFigureOut">
               <a:rPr lang="en-US" smtClean="0"/>
-              <a:t>10/19/2020</a:t>
+              <a:t>11/12/2020</a:t>
             </a:fld>
             <a:endParaRPr lang="en-US"/>
           </a:p>
@@ -3833,7 +3838,7 @@
         <p:spPr>
           <a:xfrm>
             <a:off x="6435064" y="2755709"/>
-            <a:ext cx="2970237" cy="646331"/>
+            <a:ext cx="2970237" cy="461665"/>
           </a:xfrm>
           <a:prstGeom prst="rect">
             <a:avLst/>
@@ -3847,16 +3852,6 @@
             <a:spAutoFit/>
           </a:bodyPr>
           <a:lstStyle/>
-          <a:p>
-            <a:pPr algn="ctr"/>
-            <a:r>
-              <a:rPr lang="en-US" sz="1200" dirty="0">
-                <a:latin typeface="Times New Roman" panose="02020603050405020304" pitchFamily="18" charset="0"/>
-                <a:cs typeface="Times New Roman" panose="02020603050405020304" pitchFamily="18" charset="0"/>
-              </a:rPr>
-              <a:t>Get Authorization Token [ITI-71]</a:t>
-            </a:r>
-          </a:p>
           <a:p>
             <a:pPr algn="ctr"/>
             <a:r>

</xml_diff>